<commit_message>
finished (very simple) akhci miniproject presentation slides
</commit_message>
<xml_diff>
--- a/miniprojects_presentation/706.046-AK-HCI-2020--Bernd_Malle.pptx
+++ b/miniprojects_presentation/706.046-AK-HCI-2020--Bernd_Malle.pptx
@@ -140,7 +140,7 @@
 <p1510:revInfo xmlns:a="http://schemas.openxmlformats.org/drawingml/2006/main" xmlns:r="http://schemas.openxmlformats.org/officeDocument/2006/relationships" xmlns:p1510="http://schemas.microsoft.com/office/powerpoint/2015/10/main">
   <p1510:revLst>
     <p1510:client id="{1ED39CE0-CF14-3E77-F2CA-C57576B3BCF5}" v="10" dt="2020-03-09T08:19:52.940"/>
-    <p1510:client id="{7DB545FB-1BE0-CAE9-E3E0-FD5F9D2F0DF4}" v="1340" dt="2020-03-09T13:34:47.842"/>
+    <p1510:client id="{7DB545FB-1BE0-CAE9-E3E0-FD5F9D2F0DF4}" v="3542" dt="2020-03-09T15:43:43.729"/>
   </p1510:revLst>
 </p1510:revInfo>
 </file>
@@ -150,7 +150,7 @@
   <pc:docChgLst>
     <pc:chgData name="Bernd Malle" userId="S::bernd@inodis.net::a30b9ac1-5005-41bc-9b8d-2bc5cc2c3584" providerId="AD" clId="Web-{7DB545FB-1BE0-CAE9-E3E0-FD5F9D2F0DF4}"/>
     <pc:docChg chg="addSld modSld sldOrd">
-      <pc:chgData name="Bernd Malle" userId="S::bernd@inodis.net::a30b9ac1-5005-41bc-9b8d-2bc5cc2c3584" providerId="AD" clId="Web-{7DB545FB-1BE0-CAE9-E3E0-FD5F9D2F0DF4}" dt="2020-03-09T13:34:47.842" v="1339" actId="14100"/>
+      <pc:chgData name="Bernd Malle" userId="S::bernd@inodis.net::a30b9ac1-5005-41bc-9b8d-2bc5cc2c3584" providerId="AD" clId="Web-{7DB545FB-1BE0-CAE9-E3E0-FD5F9D2F0DF4}" dt="2020-03-09T15:43:43.729" v="3541" actId="20577"/>
       <pc:docMkLst>
         <pc:docMk/>
       </pc:docMkLst>
@@ -233,7 +233,7 @@
         </pc:picChg>
       </pc:sldChg>
       <pc:sldChg chg="addSp delSp modSp add ord replId">
-        <pc:chgData name="Bernd Malle" userId="S::bernd@inodis.net::a30b9ac1-5005-41bc-9b8d-2bc5cc2c3584" providerId="AD" clId="Web-{7DB545FB-1BE0-CAE9-E3E0-FD5F9D2F0DF4}" dt="2020-03-09T13:16:52.890" v="1262" actId="1076"/>
+        <pc:chgData name="Bernd Malle" userId="S::bernd@inodis.net::a30b9ac1-5005-41bc-9b8d-2bc5cc2c3584" providerId="AD" clId="Web-{7DB545FB-1BE0-CAE9-E3E0-FD5F9D2F0DF4}" dt="2020-03-09T15:08:37.922" v="2649" actId="20577"/>
         <pc:sldMkLst>
           <pc:docMk/>
           <pc:sldMk cId="1704916903" sldId="1684"/>
@@ -247,7 +247,7 @@
           </ac:spMkLst>
         </pc:spChg>
         <pc:spChg chg="mod">
-          <ac:chgData name="Bernd Malle" userId="S::bernd@inodis.net::a30b9ac1-5005-41bc-9b8d-2bc5cc2c3584" providerId="AD" clId="Web-{7DB545FB-1BE0-CAE9-E3E0-FD5F9D2F0DF4}" dt="2020-03-09T12:49:48.257" v="822" actId="20577"/>
+          <ac:chgData name="Bernd Malle" userId="S::bernd@inodis.net::a30b9ac1-5005-41bc-9b8d-2bc5cc2c3584" providerId="AD" clId="Web-{7DB545FB-1BE0-CAE9-E3E0-FD5F9D2F0DF4}" dt="2020-03-09T15:08:37.922" v="2649" actId="20577"/>
           <ac:spMkLst>
             <pc:docMk/>
             <pc:sldMk cId="1704916903" sldId="1684"/>
@@ -304,13 +304,13 @@
         </pc:picChg>
       </pc:sldChg>
       <pc:sldChg chg="modSp add ord replId">
-        <pc:chgData name="Bernd Malle" userId="S::bernd@inodis.net::a30b9ac1-5005-41bc-9b8d-2bc5cc2c3584" providerId="AD" clId="Web-{7DB545FB-1BE0-CAE9-E3E0-FD5F9D2F0DF4}" dt="2020-03-09T12:34:05.239" v="783" actId="20577"/>
+        <pc:chgData name="Bernd Malle" userId="S::bernd@inodis.net::a30b9ac1-5005-41bc-9b8d-2bc5cc2c3584" providerId="AD" clId="Web-{7DB545FB-1BE0-CAE9-E3E0-FD5F9D2F0DF4}" dt="2020-03-09T14:56:25.648" v="2456" actId="20577"/>
         <pc:sldMkLst>
           <pc:docMk/>
           <pc:sldMk cId="1284495704" sldId="1685"/>
         </pc:sldMkLst>
         <pc:spChg chg="mod">
-          <ac:chgData name="Bernd Malle" userId="S::bernd@inodis.net::a30b9ac1-5005-41bc-9b8d-2bc5cc2c3584" providerId="AD" clId="Web-{7DB545FB-1BE0-CAE9-E3E0-FD5F9D2F0DF4}" dt="2020-03-09T12:34:05.239" v="783" actId="20577"/>
+          <ac:chgData name="Bernd Malle" userId="S::bernd@inodis.net::a30b9ac1-5005-41bc-9b8d-2bc5cc2c3584" providerId="AD" clId="Web-{7DB545FB-1BE0-CAE9-E3E0-FD5F9D2F0DF4}" dt="2020-03-09T14:56:25.648" v="2456" actId="20577"/>
           <ac:spMkLst>
             <pc:docMk/>
             <pc:sldMk cId="1284495704" sldId="1685"/>
@@ -326,23 +326,63 @@
           </ac:spMkLst>
         </pc:spChg>
       </pc:sldChg>
-      <pc:sldChg chg="modSp add replId">
-        <pc:chgData name="Bernd Malle" userId="S::bernd@inodis.net::a30b9ac1-5005-41bc-9b8d-2bc5cc2c3584" providerId="AD" clId="Web-{7DB545FB-1BE0-CAE9-E3E0-FD5F9D2F0DF4}" dt="2020-03-09T13:18:52.621" v="1277" actId="20577"/>
+      <pc:sldChg chg="addSp delSp modSp add replId">
+        <pc:chgData name="Bernd Malle" userId="S::bernd@inodis.net::a30b9ac1-5005-41bc-9b8d-2bc5cc2c3584" providerId="AD" clId="Web-{7DB545FB-1BE0-CAE9-E3E0-FD5F9D2F0DF4}" dt="2020-03-09T15:43:43.729" v="3540" actId="20577"/>
         <pc:sldMkLst>
           <pc:docMk/>
           <pc:sldMk cId="3779914732" sldId="1686"/>
         </pc:sldMkLst>
         <pc:spChg chg="mod">
-          <ac:chgData name="Bernd Malle" userId="S::bernd@inodis.net::a30b9ac1-5005-41bc-9b8d-2bc5cc2c3584" providerId="AD" clId="Web-{7DB545FB-1BE0-CAE9-E3E0-FD5F9D2F0DF4}" dt="2020-03-09T13:18:52.621" v="1277" actId="20577"/>
+          <ac:chgData name="Bernd Malle" userId="S::bernd@inodis.net::a30b9ac1-5005-41bc-9b8d-2bc5cc2c3584" providerId="AD" clId="Web-{7DB545FB-1BE0-CAE9-E3E0-FD5F9D2F0DF4}" dt="2020-03-09T15:43:43.729" v="3540" actId="20577"/>
+          <ac:spMkLst>
+            <pc:docMk/>
+            <pc:sldMk cId="3779914732" sldId="1686"/>
+            <ac:spMk id="2" creationId="{14B954C2-6834-43C9-A6F4-64377C68919F}"/>
+          </ac:spMkLst>
+        </pc:spChg>
+        <pc:spChg chg="mod">
+          <ac:chgData name="Bernd Malle" userId="S::bernd@inodis.net::a30b9ac1-5005-41bc-9b8d-2bc5cc2c3584" providerId="AD" clId="Web-{7DB545FB-1BE0-CAE9-E3E0-FD5F9D2F0DF4}" dt="2020-03-09T15:09:07.547" v="2657" actId="20577"/>
           <ac:spMkLst>
             <pc:docMk/>
             <pc:sldMk cId="3779914732" sldId="1686"/>
             <ac:spMk id="3" creationId="{79D92296-581A-403B-9F9E-36370006A1A9}"/>
           </ac:spMkLst>
         </pc:spChg>
+        <pc:spChg chg="add mod">
+          <ac:chgData name="Bernd Malle" userId="S::bernd@inodis.net::a30b9ac1-5005-41bc-9b8d-2bc5cc2c3584" providerId="AD" clId="Web-{7DB545FB-1BE0-CAE9-E3E0-FD5F9D2F0DF4}" dt="2020-03-09T15:29:32" v="2991" actId="1076"/>
+          <ac:spMkLst>
+            <pc:docMk/>
+            <pc:sldMk cId="3779914732" sldId="1686"/>
+            <ac:spMk id="8" creationId="{9030D45A-DB0E-4F44-9ED0-C2450EBCB7E2}"/>
+          </ac:spMkLst>
+        </pc:spChg>
+        <pc:picChg chg="add del mod">
+          <ac:chgData name="Bernd Malle" userId="S::bernd@inodis.net::a30b9ac1-5005-41bc-9b8d-2bc5cc2c3584" providerId="AD" clId="Web-{7DB545FB-1BE0-CAE9-E3E0-FD5F9D2F0DF4}" dt="2020-03-09T15:18:56.461" v="2802"/>
+          <ac:picMkLst>
+            <pc:docMk/>
+            <pc:sldMk cId="3779914732" sldId="1686"/>
+            <ac:picMk id="4" creationId="{03CB9A04-1D34-408D-B69C-14196E8B97D1}"/>
+          </ac:picMkLst>
+        </pc:picChg>
+        <pc:picChg chg="add del mod">
+          <ac:chgData name="Bernd Malle" userId="S::bernd@inodis.net::a30b9ac1-5005-41bc-9b8d-2bc5cc2c3584" providerId="AD" clId="Web-{7DB545FB-1BE0-CAE9-E3E0-FD5F9D2F0DF4}" dt="2020-03-09T15:18:56.446" v="2801"/>
+          <ac:picMkLst>
+            <pc:docMk/>
+            <pc:sldMk cId="3779914732" sldId="1686"/>
+            <ac:picMk id="6" creationId="{F42DDEA6-936A-464A-B786-3A0E8B41DD32}"/>
+          </ac:picMkLst>
+        </pc:picChg>
+        <pc:picChg chg="add mod">
+          <ac:chgData name="Bernd Malle" userId="S::bernd@inodis.net::a30b9ac1-5005-41bc-9b8d-2bc5cc2c3584" providerId="AD" clId="Web-{7DB545FB-1BE0-CAE9-E3E0-FD5F9D2F0DF4}" dt="2020-03-09T15:43:25.166" v="3531" actId="1076"/>
+          <ac:picMkLst>
+            <pc:docMk/>
+            <pc:sldMk cId="3779914732" sldId="1686"/>
+            <ac:picMk id="9" creationId="{E135E9A5-2512-4743-8C2D-967740E03B97}"/>
+          </ac:picMkLst>
+        </pc:picChg>
       </pc:sldChg>
-      <pc:sldChg chg="modSp add replId">
-        <pc:chgData name="Bernd Malle" userId="S::bernd@inodis.net::a30b9ac1-5005-41bc-9b8d-2bc5cc2c3584" providerId="AD" clId="Web-{7DB545FB-1BE0-CAE9-E3E0-FD5F9D2F0DF4}" dt="2020-03-09T13:19:26.699" v="1288" actId="20577"/>
+      <pc:sldChg chg="addSp modSp add replId addAnim">
+        <pc:chgData name="Bernd Malle" userId="S::bernd@inodis.net::a30b9ac1-5005-41bc-9b8d-2bc5cc2c3584" providerId="AD" clId="Web-{7DB545FB-1BE0-CAE9-E3E0-FD5F9D2F0DF4}" dt="2020-03-09T15:09:14.813" v="2659" actId="20577"/>
         <pc:sldMkLst>
           <pc:docMk/>
           <pc:sldMk cId="3993358821" sldId="1687"/>
@@ -356,22 +396,38 @@
           </ac:spMkLst>
         </pc:spChg>
         <pc:spChg chg="mod">
-          <ac:chgData name="Bernd Malle" userId="S::bernd@inodis.net::a30b9ac1-5005-41bc-9b8d-2bc5cc2c3584" providerId="AD" clId="Web-{7DB545FB-1BE0-CAE9-E3E0-FD5F9D2F0DF4}" dt="2020-03-09T13:18:57.652" v="1279" actId="20577"/>
+          <ac:chgData name="Bernd Malle" userId="S::bernd@inodis.net::a30b9ac1-5005-41bc-9b8d-2bc5cc2c3584" providerId="AD" clId="Web-{7DB545FB-1BE0-CAE9-E3E0-FD5F9D2F0DF4}" dt="2020-03-09T15:09:14.813" v="2659" actId="20577"/>
           <ac:spMkLst>
             <pc:docMk/>
             <pc:sldMk cId="3993358821" sldId="1687"/>
             <ac:spMk id="3" creationId="{79D92296-581A-403B-9F9E-36370006A1A9}"/>
           </ac:spMkLst>
         </pc:spChg>
+        <pc:spChg chg="add mod">
+          <ac:chgData name="Bernd Malle" userId="S::bernd@inodis.net::a30b9ac1-5005-41bc-9b8d-2bc5cc2c3584" providerId="AD" clId="Web-{7DB545FB-1BE0-CAE9-E3E0-FD5F9D2F0DF4}" dt="2020-03-09T15:07:34.406" v="2610" actId="14100"/>
+          <ac:spMkLst>
+            <pc:docMk/>
+            <pc:sldMk cId="3993358821" sldId="1687"/>
+            <ac:spMk id="5" creationId="{9BF2CD5D-A0BC-4D87-90F3-FD5C4A34D178}"/>
+          </ac:spMkLst>
+        </pc:spChg>
+        <pc:picChg chg="add mod ord">
+          <ac:chgData name="Bernd Malle" userId="S::bernd@inodis.net::a30b9ac1-5005-41bc-9b8d-2bc5cc2c3584" providerId="AD" clId="Web-{7DB545FB-1BE0-CAE9-E3E0-FD5F9D2F0DF4}" dt="2020-03-09T14:58:56.274" v="2521" actId="1076"/>
+          <ac:picMkLst>
+            <pc:docMk/>
+            <pc:sldMk cId="3993358821" sldId="1687"/>
+            <ac:picMk id="4" creationId="{03EFBE0F-2CFF-49B1-B0C3-E5319B9F0D27}"/>
+          </ac:picMkLst>
+        </pc:picChg>
       </pc:sldChg>
-      <pc:sldChg chg="modSp add ord replId">
-        <pc:chgData name="Bernd Malle" userId="S::bernd@inodis.net::a30b9ac1-5005-41bc-9b8d-2bc5cc2c3584" providerId="AD" clId="Web-{7DB545FB-1BE0-CAE9-E3E0-FD5F9D2F0DF4}" dt="2020-03-09T13:18:42.371" v="1275" actId="20577"/>
+      <pc:sldChg chg="addSp delSp modSp add ord replId">
+        <pc:chgData name="Bernd Malle" userId="S::bernd@inodis.net::a30b9ac1-5005-41bc-9b8d-2bc5cc2c3584" providerId="AD" clId="Web-{7DB545FB-1BE0-CAE9-E3E0-FD5F9D2F0DF4}" dt="2020-03-09T15:34:11.238" v="3059" actId="1076"/>
         <pc:sldMkLst>
           <pc:docMk/>
           <pc:sldMk cId="2864688008" sldId="1688"/>
         </pc:sldMkLst>
         <pc:spChg chg="mod">
-          <ac:chgData name="Bernd Malle" userId="S::bernd@inodis.net::a30b9ac1-5005-41bc-9b8d-2bc5cc2c3584" providerId="AD" clId="Web-{7DB545FB-1BE0-CAE9-E3E0-FD5F9D2F0DF4}" dt="2020-03-09T11:51:26.686" v="579" actId="20577"/>
+          <ac:chgData name="Bernd Malle" userId="S::bernd@inodis.net::a30b9ac1-5005-41bc-9b8d-2bc5cc2c3584" providerId="AD" clId="Web-{7DB545FB-1BE0-CAE9-E3E0-FD5F9D2F0DF4}" dt="2020-03-09T15:05:53.186" v="2581" actId="20577"/>
           <ac:spMkLst>
             <pc:docMk/>
             <pc:sldMk cId="2864688008" sldId="1688"/>
@@ -379,16 +435,40 @@
           </ac:spMkLst>
         </pc:spChg>
         <pc:spChg chg="mod">
-          <ac:chgData name="Bernd Malle" userId="S::bernd@inodis.net::a30b9ac1-5005-41bc-9b8d-2bc5cc2c3584" providerId="AD" clId="Web-{7DB545FB-1BE0-CAE9-E3E0-FD5F9D2F0DF4}" dt="2020-03-09T13:18:42.371" v="1275" actId="20577"/>
+          <ac:chgData name="Bernd Malle" userId="S::bernd@inodis.net::a30b9ac1-5005-41bc-9b8d-2bc5cc2c3584" providerId="AD" clId="Web-{7DB545FB-1BE0-CAE9-E3E0-FD5F9D2F0DF4}" dt="2020-03-09T15:00:44.541" v="2565" actId="20577"/>
           <ac:spMkLst>
             <pc:docMk/>
             <pc:sldMk cId="2864688008" sldId="1688"/>
             <ac:spMk id="3" creationId="{79D92296-581A-403B-9F9E-36370006A1A9}"/>
           </ac:spMkLst>
         </pc:spChg>
+        <pc:spChg chg="add mod">
+          <ac:chgData name="Bernd Malle" userId="S::bernd@inodis.net::a30b9ac1-5005-41bc-9b8d-2bc5cc2c3584" providerId="AD" clId="Web-{7DB545FB-1BE0-CAE9-E3E0-FD5F9D2F0DF4}" dt="2020-03-09T15:34:11.238" v="3059" actId="1076"/>
+          <ac:spMkLst>
+            <pc:docMk/>
+            <pc:sldMk cId="2864688008" sldId="1688"/>
+            <ac:spMk id="6" creationId="{D690916C-DAD9-440E-B3AB-2DA5455A0696}"/>
+          </ac:spMkLst>
+        </pc:spChg>
+        <pc:picChg chg="add del mod">
+          <ac:chgData name="Bernd Malle" userId="S::bernd@inodis.net::a30b9ac1-5005-41bc-9b8d-2bc5cc2c3584" providerId="AD" clId="Web-{7DB545FB-1BE0-CAE9-E3E0-FD5F9D2F0DF4}" dt="2020-03-09T14:26:48.642" v="1460"/>
+          <ac:picMkLst>
+            <pc:docMk/>
+            <pc:sldMk cId="2864688008" sldId="1688"/>
+            <ac:picMk id="4" creationId="{1773C68C-60E3-4598-996A-1EBF8F748052}"/>
+          </ac:picMkLst>
+        </pc:picChg>
+        <pc:picChg chg="add mod">
+          <ac:chgData name="Bernd Malle" userId="S::bernd@inodis.net::a30b9ac1-5005-41bc-9b8d-2bc5cc2c3584" providerId="AD" clId="Web-{7DB545FB-1BE0-CAE9-E3E0-FD5F9D2F0DF4}" dt="2020-03-09T15:00:15.197" v="2563" actId="1076"/>
+          <ac:picMkLst>
+            <pc:docMk/>
+            <pc:sldMk cId="2864688008" sldId="1688"/>
+            <ac:picMk id="7" creationId="{525D781B-8CDF-433C-ACB4-AA0F66DA8C54}"/>
+          </ac:picMkLst>
+        </pc:picChg>
       </pc:sldChg>
       <pc:sldChg chg="addSp delSp modSp add ord replId">
-        <pc:chgData name="Bernd Malle" userId="S::bernd@inodis.net::a30b9ac1-5005-41bc-9b8d-2bc5cc2c3584" providerId="AD" clId="Web-{7DB545FB-1BE0-CAE9-E3E0-FD5F9D2F0DF4}" dt="2020-03-09T13:34:47.842" v="1339" actId="14100"/>
+        <pc:chgData name="Bernd Malle" userId="S::bernd@inodis.net::a30b9ac1-5005-41bc-9b8d-2bc5cc2c3584" providerId="AD" clId="Web-{7DB545FB-1BE0-CAE9-E3E0-FD5F9D2F0DF4}" dt="2020-03-09T15:08:45.281" v="2652" actId="20577"/>
         <pc:sldMkLst>
           <pc:docMk/>
           <pc:sldMk cId="1158659358" sldId="1689"/>
@@ -402,7 +482,7 @@
           </ac:spMkLst>
         </pc:spChg>
         <pc:spChg chg="mod">
-          <ac:chgData name="Bernd Malle" userId="S::bernd@inodis.net::a30b9ac1-5005-41bc-9b8d-2bc5cc2c3584" providerId="AD" clId="Web-{7DB545FB-1BE0-CAE9-E3E0-FD5F9D2F0DF4}" dt="2020-03-09T12:49:55.819" v="824" actId="20577"/>
+          <ac:chgData name="Bernd Malle" userId="S::bernd@inodis.net::a30b9ac1-5005-41bc-9b8d-2bc5cc2c3584" providerId="AD" clId="Web-{7DB545FB-1BE0-CAE9-E3E0-FD5F9D2F0DF4}" dt="2020-03-09T15:08:45.281" v="2652" actId="20577"/>
           <ac:spMkLst>
             <pc:docMk/>
             <pc:sldMk cId="1158659358" sldId="1689"/>
@@ -415,6 +495,14 @@
             <pc:docMk/>
             <pc:sldMk cId="1158659358" sldId="1689"/>
             <ac:spMk id="4" creationId="{61B7D65D-2885-4AB7-ACA8-AD173B8CF3A2}"/>
+          </ac:spMkLst>
+        </pc:spChg>
+        <pc:spChg chg="add mod">
+          <ac:chgData name="Bernd Malle" userId="S::bernd@inodis.net::a30b9ac1-5005-41bc-9b8d-2bc5cc2c3584" providerId="AD" clId="Web-{7DB545FB-1BE0-CAE9-E3E0-FD5F9D2F0DF4}" dt="2020-03-09T13:57:43.831" v="1351" actId="1076"/>
+          <ac:spMkLst>
+            <pc:docMk/>
+            <pc:sldMk cId="1158659358" sldId="1689"/>
+            <ac:spMk id="5" creationId="{04679820-AF12-41B4-A650-FB1E70F16E08}"/>
           </ac:spMkLst>
         </pc:spChg>
         <pc:spChg chg="add del mod">
@@ -3104,7 +3192,7 @@
                 <a:ea typeface="+mn-lt"/>
                 <a:cs typeface="+mn-lt"/>
               </a:rPr>
-              <a:t>Task details will follow within the next 10 days – I am still collecting all the materials / putting together the pipelines </a:t>
+              <a:t>Task details, materials and code will follow within the next 2 weeks – I am still collecting all the parts &amp; assembling the pipelines </a:t>
             </a:r>
             <a:r>
               <a:rPr lang="en-US" sz="2800" dirty="0">
@@ -3113,6 +3201,10 @@
               </a:rPr>
               <a:t>;-)</a:t>
             </a:r>
+            <a:endParaRPr lang="en-US" sz="2800">
+              <a:ea typeface="+mn-lt"/>
+              <a:cs typeface="+mn-lt"/>
+            </a:endParaRPr>
           </a:p>
         </p:txBody>
       </p:sp>
@@ -4144,11 +4236,18 @@
           <a:lstStyle/>
           <a:p>
             <a:r>
+              <a:rPr lang="en-US" dirty="0">
+                <a:ea typeface="+mj-lt"/>
+                <a:cs typeface="+mj-lt"/>
+              </a:rPr>
+              <a:t>Project 1 – </a:t>
+            </a:r>
+            <a:r>
               <a:rPr lang="en-US">
                 <a:ea typeface="+mj-lt"/>
                 <a:cs typeface="+mj-lt"/>
               </a:rPr>
-              <a:t>Project 1 – Analysis of Word Vector embeddings</a:t>
+              <a:t>Background</a:t>
             </a:r>
             <a:endParaRPr lang="en-US" b="0">
               <a:ea typeface="+mj-lt"/>
@@ -4743,7 +4842,7 @@
                 <a:ea typeface="+mj-lt"/>
                 <a:cs typeface="+mj-lt"/>
               </a:rPr>
-              <a:t>Project 1 – Analysis of Word Vector embeddings</a:t>
+              <a:t>Project 1 – Tasks</a:t>
             </a:r>
             <a:endParaRPr lang="en-US" b="0">
               <a:ea typeface="+mj-lt"/>
@@ -4825,6 +4924,94 @@
           </a:prstGeom>
         </p:spPr>
       </p:pic>
+      <p:sp>
+        <p:nvSpPr>
+          <p:cNvPr id="5" name="TextBox 4">
+            <a:extLst>
+              <a:ext uri="{FF2B5EF4-FFF2-40B4-BE49-F238E27FC236}">
+                <a16:creationId xmlns:a16="http://schemas.microsoft.com/office/drawing/2014/main" id="{04679820-AF12-41B4-A650-FB1E70F16E08}"/>
+              </a:ext>
+            </a:extLst>
+          </p:cNvPr>
+          <p:cNvSpPr txBox="1"/>
+          <p:nvPr/>
+        </p:nvSpPr>
+        <p:spPr>
+          <a:xfrm>
+            <a:off x="2243470" y="5867400"/>
+            <a:ext cx="4657060" cy="461665"/>
+          </a:xfrm>
+          <a:prstGeom prst="rect">
+            <a:avLst/>
+          </a:prstGeom>
+          <a:noFill/>
+        </p:spPr>
+        <p:txBody>
+          <a:bodyPr rot="0" spcFirstLastPara="0" vertOverflow="overflow" horzOverflow="overflow" vert="horz" wrap="square" lIns="91440" tIns="45720" rIns="91440" bIns="45720" numCol="1" spcCol="0" rtlCol="0" fromWordArt="0" anchor="t" anchorCtr="0" forceAA="0" compatLnSpc="1">
+            <a:prstTxWarp prst="textNoShape">
+              <a:avLst/>
+            </a:prstTxWarp>
+            <a:spAutoFit/>
+          </a:bodyPr>
+          <a:lstStyle/>
+          <a:p>
+            <a:r>
+              <a:rPr lang="en-US" sz="1200">
+                <a:solidFill>
+                  <a:srgbClr val="333333"/>
+                </a:solidFill>
+                <a:latin typeface="Calibri"/>
+                <a:cs typeface="Calibri"/>
+              </a:rPr>
+              <a:t>Heimerl, F., &amp; Gleicher, M. (2018). Interactive Analysis of Word Vector Embeddings. </a:t>
+            </a:r>
+            <a:r>
+              <a:rPr lang="en-US" sz="1200" i="1">
+                <a:solidFill>
+                  <a:srgbClr val="333333"/>
+                </a:solidFill>
+                <a:latin typeface="Calibri"/>
+                <a:cs typeface="Calibri"/>
+              </a:rPr>
+              <a:t>Computer Graphics Forum</a:t>
+            </a:r>
+            <a:r>
+              <a:rPr lang="en-US" sz="1200">
+                <a:solidFill>
+                  <a:srgbClr val="333333"/>
+                </a:solidFill>
+                <a:latin typeface="Calibri"/>
+                <a:cs typeface="Calibri"/>
+              </a:rPr>
+              <a:t>, </a:t>
+            </a:r>
+            <a:r>
+              <a:rPr lang="en-US" sz="1200" i="1">
+                <a:solidFill>
+                  <a:srgbClr val="333333"/>
+                </a:solidFill>
+                <a:latin typeface="Calibri"/>
+                <a:cs typeface="Calibri"/>
+              </a:rPr>
+              <a:t>37</a:t>
+            </a:r>
+            <a:r>
+              <a:rPr lang="en-US" sz="1200">
+                <a:solidFill>
+                  <a:srgbClr val="333333"/>
+                </a:solidFill>
+                <a:latin typeface="Calibri"/>
+                <a:cs typeface="Calibri"/>
+              </a:rPr>
+              <a:t>(3). doi:10.1111/cgf.13417</a:t>
+            </a:r>
+            <a:endParaRPr lang="en-US" sz="1200">
+              <a:latin typeface="Calibri"/>
+              <a:cs typeface="Calibri"/>
+            </a:endParaRPr>
+          </a:p>
+        </p:txBody>
+      </p:sp>
     </p:spTree>
     <p:extLst>
       <p:ext uri="{BB962C8B-B14F-4D97-AF65-F5344CB8AC3E}">
@@ -5201,7 +5388,7 @@
         <p:spPr>
           <a:xfrm>
             <a:off x="251520" y="620689"/>
-            <a:ext cx="8640960" cy="5544615"/>
+            <a:ext cx="8640960" cy="5172476"/>
           </a:xfrm>
         </p:spPr>
         <p:txBody>
@@ -5218,21 +5405,139 @@
                 <a:ea typeface="+mn-lt"/>
                 <a:cs typeface="+mn-lt"/>
               </a:rPr>
-              <a:t>Visualization of personalized recommender graphs, explanations &amp; animation of their change over time</a:t>
-            </a:r>
-            <a:endParaRPr lang="en-US"/>
-          </a:p>
-          <a:p>
-            <a:pPr marL="914400" lvl="1" indent="-457200">
-              <a:buFont typeface="Arial,Sans-Serif"/>
-              <a:buChar char="•"/>
-            </a:pPr>
+              <a:t>Visualization of personal recommender graphs (</a:t>
+            </a:r>
+            <a:r>
+              <a:rPr lang="en-US" i="1">
+                <a:ea typeface="+mn-lt"/>
+                <a:cs typeface="+mn-lt"/>
+              </a:rPr>
+              <a:t>"Local Sphere" </a:t>
+            </a:r>
             <a:r>
               <a:rPr lang="en-US">
                 <a:ea typeface="+mn-lt"/>
                 <a:cs typeface="+mn-lt"/>
               </a:rPr>
-              <a:t>Starting with a general sub-graph we draw from a </a:t>
+              <a:t>) &amp; their change over time</a:t>
+            </a:r>
+            <a:endParaRPr lang="en-US" sz="2400">
+              <a:ea typeface="+mn-lt"/>
+              <a:cs typeface="+mn-lt"/>
+            </a:endParaRPr>
+          </a:p>
+          <a:p>
+            <a:pPr marL="0" indent="0">
+              <a:buNone/>
+            </a:pPr>
+            <a:endParaRPr lang="en-US" sz="1000" dirty="0">
+              <a:ea typeface="+mn-lt"/>
+              <a:cs typeface="+mn-lt"/>
+            </a:endParaRPr>
+          </a:p>
+          <a:p>
+            <a:pPr marL="0" indent="0">
+              <a:buNone/>
+            </a:pPr>
+            <a:r>
+              <a:rPr lang="en-US" sz="2400">
+                <a:ea typeface="+mn-lt"/>
+                <a:cs typeface="+mn-lt"/>
+              </a:rPr>
+              <a:t>Drawing from globally </a:t>
+            </a:r>
+          </a:p>
+          <a:p>
+            <a:pPr marL="0" indent="0">
+              <a:buNone/>
+            </a:pPr>
+            <a:r>
+              <a:rPr lang="en-US" sz="2400" dirty="0">
+                <a:cs typeface="Calibri"/>
+              </a:rPr>
+              <a:t>available resources (</a:t>
+            </a:r>
+            <a:r>
+              <a:rPr lang="en-US" sz="2400">
+                <a:cs typeface="Calibri"/>
+              </a:rPr>
+              <a:t>e.g. a</a:t>
+            </a:r>
+            <a:endParaRPr lang="en-US" sz="2400" dirty="0">
+              <a:cs typeface="Calibri"/>
+            </a:endParaRPr>
+          </a:p>
+          <a:p>
+            <a:pPr marL="0" indent="0">
+              <a:buNone/>
+            </a:pPr>
+            <a:r>
+              <a:rPr lang="en-US" sz="2400">
+                <a:cs typeface="Calibri"/>
+              </a:rPr>
+              <a:t>webshop database en-</a:t>
+            </a:r>
+            <a:endParaRPr lang="en-US" sz="2400" dirty="0">
+              <a:cs typeface="Calibri"/>
+            </a:endParaRPr>
+          </a:p>
+          <a:p>
+            <a:pPr marL="0" indent="0">
+              <a:buNone/>
+            </a:pPr>
+            <a:r>
+              <a:rPr lang="en-US" sz="2400">
+                <a:cs typeface="Calibri"/>
+              </a:rPr>
+              <a:t>riched similarities)</a:t>
+            </a:r>
+          </a:p>
+          <a:p>
+            <a:pPr marL="0" indent="0">
+              <a:buNone/>
+            </a:pPr>
+            <a:r>
+              <a:rPr lang="en-US" sz="2400">
+                <a:cs typeface="Calibri"/>
+              </a:rPr>
+              <a:t>each user derives her own </a:t>
+            </a:r>
+            <a:endParaRPr lang="en-US" sz="2400" dirty="0">
+              <a:cs typeface="Calibri"/>
+            </a:endParaRPr>
+          </a:p>
+          <a:p>
+            <a:pPr marL="0" indent="0">
+              <a:buNone/>
+            </a:pPr>
+            <a:r>
+              <a:rPr lang="en-US" sz="2400">
+                <a:cs typeface="Calibri"/>
+              </a:rPr>
+              <a:t>local sub-graph representing </a:t>
+            </a:r>
+          </a:p>
+          <a:p>
+            <a:pPr marL="0" indent="0">
+              <a:buNone/>
+            </a:pPr>
+            <a:r>
+              <a:rPr lang="en-US" sz="2400" dirty="0">
+                <a:cs typeface="Calibri"/>
+              </a:rPr>
+              <a:t>her context / potential interests. As she interacts with the system (explores &amp; follows / ignores visual clues), </a:t>
+            </a:r>
+            <a:r>
+              <a:rPr lang="en-US" sz="2400">
+                <a:cs typeface="Calibri"/>
+              </a:rPr>
+              <a:t>this context is refined &amp; </a:t>
+            </a:r>
+            <a:r>
+              <a:rPr lang="en-US" sz="2400" dirty="0">
+                <a:cs typeface="Calibri"/>
+              </a:rPr>
+              <a:t>the graph should respond accordingly.</a:t>
             </a:r>
             <a:endParaRPr lang="en-US"/>
           </a:p>
@@ -5264,11 +5569,82 @@
                 <a:ea typeface="+mj-lt"/>
                 <a:cs typeface="+mj-lt"/>
               </a:rPr>
-              <a:t>Project 2 – Visualization &amp; anim. of graph interaction</a:t>
+              <a:t>Project 2 – Visualization of graph interaction</a:t>
             </a:r>
           </a:p>
         </p:txBody>
       </p:sp>
+      <p:sp>
+        <p:nvSpPr>
+          <p:cNvPr id="6" name="TextBox 5">
+            <a:extLst>
+              <a:ext uri="{FF2B5EF4-FFF2-40B4-BE49-F238E27FC236}">
+                <a16:creationId xmlns:a16="http://schemas.microsoft.com/office/drawing/2014/main" id="{D690916C-DAD9-440E-B3AB-2DA5455A0696}"/>
+              </a:ext>
+            </a:extLst>
+          </p:cNvPr>
+          <p:cNvSpPr txBox="1"/>
+          <p:nvPr/>
+        </p:nvSpPr>
+        <p:spPr>
+          <a:xfrm>
+            <a:off x="852377" y="5778795"/>
+            <a:ext cx="7448106" cy="646331"/>
+          </a:xfrm>
+          <a:prstGeom prst="rect">
+            <a:avLst/>
+          </a:prstGeom>
+          <a:noFill/>
+        </p:spPr>
+        <p:txBody>
+          <a:bodyPr rot="0" spcFirstLastPara="0" vertOverflow="overflow" horzOverflow="overflow" vert="horz" wrap="square" lIns="91440" tIns="45720" rIns="91440" bIns="45720" numCol="1" spcCol="0" rtlCol="0" fromWordArt="0" anchor="t" anchorCtr="0" forceAA="0" compatLnSpc="1">
+            <a:prstTxWarp prst="textNoShape">
+              <a:avLst/>
+            </a:prstTxWarp>
+            <a:spAutoFit/>
+          </a:bodyPr>
+          <a:lstStyle/>
+          <a:p>
+            <a:r>
+              <a:rPr lang="en-US" sz="1200"/>
+              <a:t>Bernd Malle, Nicola Giuliani, Peter Kieseberg, and Andreas Holzinger. The More the Merrier - Federated Learning from Local Sphere Recommendations. In Machine Learning and Knowledge Extraction, IFIP CD-MAKE, Lecture Notes in Computer Science LNCS 10410, pages 367–374. Springer, Cham, 2017. doi: 10.1007/978-3-319-66808-6 24.</a:t>
+            </a:r>
+            <a:endParaRPr lang="en-US" sz="1200">
+              <a:cs typeface="Calibri"/>
+            </a:endParaRPr>
+          </a:p>
+        </p:txBody>
+      </p:sp>
+      <p:pic>
+        <p:nvPicPr>
+          <p:cNvPr id="7" name="Picture 7">
+            <a:extLst>
+              <a:ext uri="{FF2B5EF4-FFF2-40B4-BE49-F238E27FC236}">
+                <a16:creationId xmlns:a16="http://schemas.microsoft.com/office/drawing/2014/main" id="{525D781B-8CDF-433C-ACB4-AA0F66DA8C54}"/>
+              </a:ext>
+            </a:extLst>
+          </p:cNvPr>
+          <p:cNvPicPr>
+            <a:picLocks noChangeAspect="1"/>
+          </p:cNvPicPr>
+          <p:nvPr/>
+        </p:nvPicPr>
+        <p:blipFill>
+          <a:blip r:embed="rId2"/>
+          <a:stretch>
+            <a:fillRect/>
+          </a:stretch>
+        </p:blipFill>
+        <p:spPr>
+          <a:xfrm>
+            <a:off x="3882655" y="1821771"/>
+            <a:ext cx="4541876" cy="2576505"/>
+          </a:xfrm>
+          <a:prstGeom prst="rect">
+            <a:avLst/>
+          </a:prstGeom>
+        </p:spPr>
+      </p:pic>
     </p:spTree>
     <p:extLst>
       <p:ext uri="{BB962C8B-B14F-4D97-AF65-F5344CB8AC3E}">
@@ -5330,15 +5706,33 @@
                                   </p:childTnLst>
                                 </p:cTn>
                               </p:par>
+                            </p:childTnLst>
+                          </p:cTn>
+                        </p:par>
+                      </p:childTnLst>
+                    </p:cTn>
+                  </p:par>
+                  <p:par>
+                    <p:cTn id="7" fill="hold">
+                      <p:stCondLst>
+                        <p:cond delay="indefinite"/>
+                      </p:stCondLst>
+                      <p:childTnLst>
+                        <p:par>
+                          <p:cTn id="8" fill="hold">
+                            <p:stCondLst>
+                              <p:cond delay="0"/>
+                            </p:stCondLst>
+                            <p:childTnLst>
                               <p:par>
-                                <p:cTn id="7" presetID="1" presetClass="entr" presetSubtype="0" fill="hold" grpId="0" nodeType="withEffect">
+                                <p:cTn id="9" presetID="1" presetClass="entr" presetSubtype="0" fill="hold" grpId="0" nodeType="clickEffect">
                                   <p:stCondLst>
                                     <p:cond delay="0"/>
                                   </p:stCondLst>
                                   <p:childTnLst>
                                     <p:set>
                                       <p:cBhvr>
-                                        <p:cTn id="8" dur="1" fill="hold">
+                                        <p:cTn id="10" dur="1" fill="hold">
                                           <p:stCondLst>
                                             <p:cond delay="0"/>
                                           </p:stCondLst>
@@ -5346,7 +5740,301 @@
                                         <p:tgtEl>
                                           <p:spTgt spid="2">
                                             <p:txEl>
-                                              <p:pRg st="1" end="1"/>
+                                              <p:pRg st="2" end="2"/>
+                                            </p:txEl>
+                                          </p:spTgt>
+                                        </p:tgtEl>
+                                        <p:attrNameLst>
+                                          <p:attrName>style.visibility</p:attrName>
+                                        </p:attrNameLst>
+                                      </p:cBhvr>
+                                      <p:to>
+                                        <p:strVal val="visible"/>
+                                      </p:to>
+                                    </p:set>
+                                  </p:childTnLst>
+                                </p:cTn>
+                              </p:par>
+                            </p:childTnLst>
+                          </p:cTn>
+                        </p:par>
+                      </p:childTnLst>
+                    </p:cTn>
+                  </p:par>
+                  <p:par>
+                    <p:cTn id="11" fill="hold">
+                      <p:stCondLst>
+                        <p:cond delay="indefinite"/>
+                      </p:stCondLst>
+                      <p:childTnLst>
+                        <p:par>
+                          <p:cTn id="12" fill="hold">
+                            <p:stCondLst>
+                              <p:cond delay="0"/>
+                            </p:stCondLst>
+                            <p:childTnLst>
+                              <p:par>
+                                <p:cTn id="13" presetID="1" presetClass="entr" presetSubtype="0" fill="hold" grpId="0" nodeType="clickEffect">
+                                  <p:stCondLst>
+                                    <p:cond delay="0"/>
+                                  </p:stCondLst>
+                                  <p:childTnLst>
+                                    <p:set>
+                                      <p:cBhvr>
+                                        <p:cTn id="14" dur="1" fill="hold">
+                                          <p:stCondLst>
+                                            <p:cond delay="0"/>
+                                          </p:stCondLst>
+                                        </p:cTn>
+                                        <p:tgtEl>
+                                          <p:spTgt spid="2">
+                                            <p:txEl>
+                                              <p:pRg st="3" end="3"/>
+                                            </p:txEl>
+                                          </p:spTgt>
+                                        </p:tgtEl>
+                                        <p:attrNameLst>
+                                          <p:attrName>style.visibility</p:attrName>
+                                        </p:attrNameLst>
+                                      </p:cBhvr>
+                                      <p:to>
+                                        <p:strVal val="visible"/>
+                                      </p:to>
+                                    </p:set>
+                                  </p:childTnLst>
+                                </p:cTn>
+                              </p:par>
+                            </p:childTnLst>
+                          </p:cTn>
+                        </p:par>
+                      </p:childTnLst>
+                    </p:cTn>
+                  </p:par>
+                  <p:par>
+                    <p:cTn id="15" fill="hold">
+                      <p:stCondLst>
+                        <p:cond delay="indefinite"/>
+                      </p:stCondLst>
+                      <p:childTnLst>
+                        <p:par>
+                          <p:cTn id="16" fill="hold">
+                            <p:stCondLst>
+                              <p:cond delay="0"/>
+                            </p:stCondLst>
+                            <p:childTnLst>
+                              <p:par>
+                                <p:cTn id="17" presetID="1" presetClass="entr" presetSubtype="0" fill="hold" grpId="0" nodeType="clickEffect">
+                                  <p:stCondLst>
+                                    <p:cond delay="0"/>
+                                  </p:stCondLst>
+                                  <p:childTnLst>
+                                    <p:set>
+                                      <p:cBhvr>
+                                        <p:cTn id="18" dur="1" fill="hold">
+                                          <p:stCondLst>
+                                            <p:cond delay="0"/>
+                                          </p:stCondLst>
+                                        </p:cTn>
+                                        <p:tgtEl>
+                                          <p:spTgt spid="2">
+                                            <p:txEl>
+                                              <p:pRg st="4" end="4"/>
+                                            </p:txEl>
+                                          </p:spTgt>
+                                        </p:tgtEl>
+                                        <p:attrNameLst>
+                                          <p:attrName>style.visibility</p:attrName>
+                                        </p:attrNameLst>
+                                      </p:cBhvr>
+                                      <p:to>
+                                        <p:strVal val="visible"/>
+                                      </p:to>
+                                    </p:set>
+                                  </p:childTnLst>
+                                </p:cTn>
+                              </p:par>
+                            </p:childTnLst>
+                          </p:cTn>
+                        </p:par>
+                      </p:childTnLst>
+                    </p:cTn>
+                  </p:par>
+                  <p:par>
+                    <p:cTn id="19" fill="hold">
+                      <p:stCondLst>
+                        <p:cond delay="indefinite"/>
+                      </p:stCondLst>
+                      <p:childTnLst>
+                        <p:par>
+                          <p:cTn id="20" fill="hold">
+                            <p:stCondLst>
+                              <p:cond delay="0"/>
+                            </p:stCondLst>
+                            <p:childTnLst>
+                              <p:par>
+                                <p:cTn id="21" presetID="1" presetClass="entr" presetSubtype="0" fill="hold" grpId="0" nodeType="clickEffect">
+                                  <p:stCondLst>
+                                    <p:cond delay="0"/>
+                                  </p:stCondLst>
+                                  <p:childTnLst>
+                                    <p:set>
+                                      <p:cBhvr>
+                                        <p:cTn id="22" dur="1" fill="hold">
+                                          <p:stCondLst>
+                                            <p:cond delay="0"/>
+                                          </p:stCondLst>
+                                        </p:cTn>
+                                        <p:tgtEl>
+                                          <p:spTgt spid="2">
+                                            <p:txEl>
+                                              <p:pRg st="5" end="5"/>
+                                            </p:txEl>
+                                          </p:spTgt>
+                                        </p:tgtEl>
+                                        <p:attrNameLst>
+                                          <p:attrName>style.visibility</p:attrName>
+                                        </p:attrNameLst>
+                                      </p:cBhvr>
+                                      <p:to>
+                                        <p:strVal val="visible"/>
+                                      </p:to>
+                                    </p:set>
+                                  </p:childTnLst>
+                                </p:cTn>
+                              </p:par>
+                            </p:childTnLst>
+                          </p:cTn>
+                        </p:par>
+                      </p:childTnLst>
+                    </p:cTn>
+                  </p:par>
+                  <p:par>
+                    <p:cTn id="23" fill="hold">
+                      <p:stCondLst>
+                        <p:cond delay="indefinite"/>
+                      </p:stCondLst>
+                      <p:childTnLst>
+                        <p:par>
+                          <p:cTn id="24" fill="hold">
+                            <p:stCondLst>
+                              <p:cond delay="0"/>
+                            </p:stCondLst>
+                            <p:childTnLst>
+                              <p:par>
+                                <p:cTn id="25" presetID="1" presetClass="entr" presetSubtype="0" fill="hold" grpId="0" nodeType="clickEffect">
+                                  <p:stCondLst>
+                                    <p:cond delay="0"/>
+                                  </p:stCondLst>
+                                  <p:childTnLst>
+                                    <p:set>
+                                      <p:cBhvr>
+                                        <p:cTn id="26" dur="1" fill="hold">
+                                          <p:stCondLst>
+                                            <p:cond delay="0"/>
+                                          </p:stCondLst>
+                                        </p:cTn>
+                                        <p:tgtEl>
+                                          <p:spTgt spid="2">
+                                            <p:txEl>
+                                              <p:pRg st="6" end="6"/>
+                                            </p:txEl>
+                                          </p:spTgt>
+                                        </p:tgtEl>
+                                        <p:attrNameLst>
+                                          <p:attrName>style.visibility</p:attrName>
+                                        </p:attrNameLst>
+                                      </p:cBhvr>
+                                      <p:to>
+                                        <p:strVal val="visible"/>
+                                      </p:to>
+                                    </p:set>
+                                  </p:childTnLst>
+                                </p:cTn>
+                              </p:par>
+                            </p:childTnLst>
+                          </p:cTn>
+                        </p:par>
+                      </p:childTnLst>
+                    </p:cTn>
+                  </p:par>
+                  <p:par>
+                    <p:cTn id="27" fill="hold">
+                      <p:stCondLst>
+                        <p:cond delay="indefinite"/>
+                      </p:stCondLst>
+                      <p:childTnLst>
+                        <p:par>
+                          <p:cTn id="28" fill="hold">
+                            <p:stCondLst>
+                              <p:cond delay="0"/>
+                            </p:stCondLst>
+                            <p:childTnLst>
+                              <p:par>
+                                <p:cTn id="29" presetID="1" presetClass="entr" presetSubtype="0" fill="hold" grpId="0" nodeType="clickEffect">
+                                  <p:stCondLst>
+                                    <p:cond delay="0"/>
+                                  </p:stCondLst>
+                                  <p:childTnLst>
+                                    <p:set>
+                                      <p:cBhvr>
+                                        <p:cTn id="30" dur="1" fill="hold">
+                                          <p:stCondLst>
+                                            <p:cond delay="0"/>
+                                          </p:stCondLst>
+                                        </p:cTn>
+                                        <p:tgtEl>
+                                          <p:spTgt spid="2">
+                                            <p:txEl>
+                                              <p:pRg st="7" end="7"/>
+                                            </p:txEl>
+                                          </p:spTgt>
+                                        </p:tgtEl>
+                                        <p:attrNameLst>
+                                          <p:attrName>style.visibility</p:attrName>
+                                        </p:attrNameLst>
+                                      </p:cBhvr>
+                                      <p:to>
+                                        <p:strVal val="visible"/>
+                                      </p:to>
+                                    </p:set>
+                                  </p:childTnLst>
+                                </p:cTn>
+                              </p:par>
+                            </p:childTnLst>
+                          </p:cTn>
+                        </p:par>
+                      </p:childTnLst>
+                    </p:cTn>
+                  </p:par>
+                  <p:par>
+                    <p:cTn id="31" fill="hold">
+                      <p:stCondLst>
+                        <p:cond delay="indefinite"/>
+                      </p:stCondLst>
+                      <p:childTnLst>
+                        <p:par>
+                          <p:cTn id="32" fill="hold">
+                            <p:stCondLst>
+                              <p:cond delay="0"/>
+                            </p:stCondLst>
+                            <p:childTnLst>
+                              <p:par>
+                                <p:cTn id="33" presetID="1" presetClass="entr" presetSubtype="0" fill="hold" grpId="0" nodeType="clickEffect">
+                                  <p:stCondLst>
+                                    <p:cond delay="0"/>
+                                  </p:stCondLst>
+                                  <p:childTnLst>
+                                    <p:set>
+                                      <p:cBhvr>
+                                        <p:cTn id="34" dur="1" fill="hold">
+                                          <p:stCondLst>
+                                            <p:cond delay="0"/>
+                                          </p:stCondLst>
+                                        </p:cTn>
+                                        <p:tgtEl>
+                                          <p:spTgt spid="2">
+                                            <p:txEl>
+                                              <p:pRg st="8" end="8"/>
                                             </p:txEl>
                                           </p:spTgt>
                                         </p:tgtEl>
@@ -5430,21 +6118,120 @@
         </p:nvSpPr>
         <p:spPr>
           <a:xfrm>
-            <a:off x="251520" y="620689"/>
-            <a:ext cx="8640960" cy="5544615"/>
+            <a:off x="251520" y="673852"/>
+            <a:ext cx="8640960" cy="5385127"/>
           </a:xfrm>
         </p:spPr>
         <p:txBody>
           <a:bodyPr vert="horz" lIns="91440" tIns="45720" rIns="91440" bIns="45720" rtlCol="0" anchor="t">
-            <a:normAutofit/>
+            <a:normAutofit lnSpcReduction="10000"/>
           </a:bodyPr>
           <a:lstStyle/>
+          <a:p>
+            <a:pPr marL="457200" indent="-457200">
+              <a:buFont typeface="Arial" pitchFamily="2" charset="2"/>
+              <a:buChar char="•"/>
+            </a:pPr>
+            <a:r>
+              <a:rPr lang="en-US" sz="2400">
+                <a:cs typeface="Calibri"/>
+              </a:rPr>
+              <a:t>Explainability of deep learning systems is a must, but still in the early stages (except for cat pics ;-)</a:t>
+            </a:r>
+            <a:endParaRPr lang="en-US" sz="2400" dirty="0">
+              <a:cs typeface="Calibri"/>
+            </a:endParaRPr>
+          </a:p>
           <a:p>
             <a:pPr marL="0" indent="0">
               <a:buNone/>
             </a:pPr>
-            <a:endParaRPr lang="en-US" dirty="0">
+            <a:endParaRPr lang="en-US" sz="2400" dirty="0">
               <a:cs typeface="Calibri"/>
+            </a:endParaRPr>
+          </a:p>
+          <a:p>
+            <a:pPr marL="0" indent="0">
+              <a:buNone/>
+            </a:pPr>
+            <a:endParaRPr lang="en-US" sz="2400" dirty="0">
+              <a:cs typeface="Calibri"/>
+            </a:endParaRPr>
+          </a:p>
+          <a:p>
+            <a:pPr marL="457200" indent="-457200">
+              <a:buFont typeface="Arial" pitchFamily="2" charset="2"/>
+              <a:buChar char="•"/>
+            </a:pPr>
+            <a:r>
+              <a:rPr lang="en-US" sz="2400">
+                <a:cs typeface="Calibri"/>
+              </a:rPr>
+              <a:t>non-visual and / or higher dimensional data are not intuitive to the human brain – decisions made in those spaces aren't either</a:t>
+            </a:r>
+            <a:endParaRPr lang="en-US" sz="2400" dirty="0">
+              <a:cs typeface="Calibri"/>
+            </a:endParaRPr>
+          </a:p>
+          <a:p>
+            <a:pPr marL="457200" indent="-457200">
+              <a:buFont typeface="Arial" pitchFamily="2" charset="2"/>
+              <a:buChar char="•"/>
+            </a:pPr>
+            <a:endParaRPr lang="en-US" sz="2400" dirty="0">
+              <a:cs typeface="Calibri"/>
+            </a:endParaRPr>
+          </a:p>
+          <a:p>
+            <a:pPr marL="457200" indent="-457200">
+              <a:buFont typeface="Arial" pitchFamily="2" charset="2"/>
+              <a:buChar char="•"/>
+            </a:pPr>
+            <a:r>
+              <a:rPr lang="en-US" sz="2400">
+                <a:cs typeface="Calibri"/>
+              </a:rPr>
+              <a:t>graphs are a convenient way to break-down high-dimensional information by reducing their complexity to concepts like similarity, connection, and influence.</a:t>
+            </a:r>
+          </a:p>
+          <a:p>
+            <a:pPr marL="457200" indent="-457200">
+              <a:buFont typeface="Arial" pitchFamily="2" charset="2"/>
+              <a:buChar char="•"/>
+            </a:pPr>
+            <a:endParaRPr lang="en-US" sz="2400">
+              <a:cs typeface="Calibri"/>
+            </a:endParaRPr>
+          </a:p>
+          <a:p>
+            <a:pPr marL="457200" indent="-457200">
+              <a:buFont typeface="Arial" pitchFamily="2" charset="2"/>
+              <a:buChar char="•"/>
+            </a:pPr>
+            <a:r>
+              <a:rPr lang="en-US" sz="2400">
+                <a:cs typeface="Calibri"/>
+              </a:rPr>
+              <a:t>understanding which graph metrics will change with</a:t>
+            </a:r>
+            <a:r>
+              <a:rPr lang="en-US" sz="2400">
+                <a:ea typeface="+mn-lt"/>
+                <a:cs typeface="+mn-lt"/>
+              </a:rPr>
+              <a:t> user interactions will help develop an intuition about what factors in the original high-dimensional space are relevant for decisions!</a:t>
+            </a:r>
+            <a:endParaRPr lang="en-US" sz="2400">
+              <a:cs typeface="Calibri"/>
+            </a:endParaRPr>
+          </a:p>
+          <a:p>
+            <a:pPr marL="0" indent="0">
+              <a:buNone/>
+            </a:pPr>
+            <a:endParaRPr lang="en-US" sz="2400" dirty="0">
+              <a:ea typeface="+mn-lt"/>
+              <a:cs typeface="+mn-lt"/>
             </a:endParaRPr>
           </a:p>
         </p:txBody>
@@ -5475,7 +6262,7 @@
                 <a:ea typeface="+mj-lt"/>
                 <a:cs typeface="+mj-lt"/>
               </a:rPr>
-              <a:t>Project 2 – Visualization &amp; anim. of graph interaction</a:t>
+              <a:t>Project 2 – Background</a:t>
             </a:r>
             <a:endParaRPr lang="en-US" b="0">
               <a:ea typeface="+mj-lt"/>
@@ -5484,6 +6271,79 @@
           </a:p>
         </p:txBody>
       </p:sp>
+      <p:sp>
+        <p:nvSpPr>
+          <p:cNvPr id="8" name="TextBox 7">
+            <a:extLst>
+              <a:ext uri="{FF2B5EF4-FFF2-40B4-BE49-F238E27FC236}">
+                <a16:creationId xmlns:a16="http://schemas.microsoft.com/office/drawing/2014/main" id="{9030D45A-DB0E-4F44-9ED0-C2450EBCB7E2}"/>
+              </a:ext>
+            </a:extLst>
+          </p:cNvPr>
+          <p:cNvSpPr txBox="1"/>
+          <p:nvPr/>
+        </p:nvSpPr>
+        <p:spPr>
+          <a:xfrm>
+            <a:off x="808075" y="6150935"/>
+            <a:ext cx="7536712" cy="276999"/>
+          </a:xfrm>
+          <a:prstGeom prst="rect">
+            <a:avLst/>
+          </a:prstGeom>
+          <a:noFill/>
+        </p:spPr>
+        <p:txBody>
+          <a:bodyPr rot="0" spcFirstLastPara="0" vertOverflow="overflow" horzOverflow="overflow" vert="horz" wrap="square" lIns="91440" tIns="45720" rIns="91440" bIns="45720" numCol="1" spcCol="0" rtlCol="0" fromWordArt="0" anchor="t" anchorCtr="0" forceAA="0" compatLnSpc="1">
+            <a:prstTxWarp prst="textNoShape">
+              <a:avLst/>
+            </a:prstTxWarp>
+            <a:spAutoFit/>
+          </a:bodyPr>
+          <a:lstStyle/>
+          <a:p>
+            <a:r>
+              <a:rPr lang="en-US" sz="1200" dirty="0">
+                <a:hlinkClick r:id="rId2"/>
+              </a:rPr>
+              <a:t>https://medium.com/google-developer-experts/interpreting-deep-learning-models-for-computer-vision-f95683e23c1d</a:t>
+            </a:r>
+            <a:endParaRPr lang="en-US" sz="1200" dirty="0">
+              <a:cs typeface="Calibri"/>
+            </a:endParaRPr>
+          </a:p>
+        </p:txBody>
+      </p:sp>
+      <p:pic>
+        <p:nvPicPr>
+          <p:cNvPr id="9" name="Picture 9">
+            <a:extLst>
+              <a:ext uri="{FF2B5EF4-FFF2-40B4-BE49-F238E27FC236}">
+                <a16:creationId xmlns:a16="http://schemas.microsoft.com/office/drawing/2014/main" id="{E135E9A5-2512-4743-8C2D-967740E03B97}"/>
+              </a:ext>
+            </a:extLst>
+          </p:cNvPr>
+          <p:cNvPicPr>
+            <a:picLocks noChangeAspect="1"/>
+          </p:cNvPicPr>
+          <p:nvPr/>
+        </p:nvPicPr>
+        <p:blipFill>
+          <a:blip r:embed="rId3"/>
+          <a:stretch>
+            <a:fillRect/>
+          </a:stretch>
+        </p:blipFill>
+        <p:spPr>
+          <a:xfrm>
+            <a:off x="5069958" y="1081042"/>
+            <a:ext cx="3576084" cy="1151728"/>
+          </a:xfrm>
+          <a:prstGeom prst="rect">
+            <a:avLst/>
+          </a:prstGeom>
+        </p:spPr>
+      </p:pic>
     </p:spTree>
     <p:extLst>
       <p:ext uri="{BB962C8B-B14F-4D97-AF65-F5344CB8AC3E}">
@@ -5515,15 +6375,10 @@
                             </p:stCondLst>
                             <p:childTnLst>
                               <p:par>
-                                <p:cTn id="5" presetID="1" presetClass="entr" presetSubtype="0" fill="hold" grpId="0" nodeType="clickEffect" nodePh="1">
+                                <p:cTn id="5" presetID="1" presetClass="entr" presetSubtype="0" fill="hold" grpId="0" nodeType="clickEffect">
                                   <p:stCondLst>
                                     <p:cond delay="0"/>
                                   </p:stCondLst>
-                                  <p:endCondLst>
-                                    <p:cond evt="begin" delay="0">
-                                      <p:tn val="5"/>
-                                    </p:cond>
-                                  </p:endCondLst>
                                   <p:childTnLst>
                                     <p:set>
                                       <p:cBhvr>
@@ -5536,6 +6391,153 @@
                                           <p:spTgt spid="2">
                                             <p:txEl>
                                               <p:pRg st="0" end="0"/>
+                                            </p:txEl>
+                                          </p:spTgt>
+                                        </p:tgtEl>
+                                        <p:attrNameLst>
+                                          <p:attrName>style.visibility</p:attrName>
+                                        </p:attrNameLst>
+                                      </p:cBhvr>
+                                      <p:to>
+                                        <p:strVal val="visible"/>
+                                      </p:to>
+                                    </p:set>
+                                  </p:childTnLst>
+                                </p:cTn>
+                              </p:par>
+                            </p:childTnLst>
+                          </p:cTn>
+                        </p:par>
+                      </p:childTnLst>
+                    </p:cTn>
+                  </p:par>
+                  <p:par>
+                    <p:cTn id="7" fill="hold">
+                      <p:stCondLst>
+                        <p:cond delay="indefinite"/>
+                      </p:stCondLst>
+                      <p:childTnLst>
+                        <p:par>
+                          <p:cTn id="8" fill="hold">
+                            <p:stCondLst>
+                              <p:cond delay="0"/>
+                            </p:stCondLst>
+                            <p:childTnLst>
+                              <p:par>
+                                <p:cTn id="9" presetID="1" presetClass="entr" presetSubtype="0" fill="hold" grpId="0" nodeType="clickEffect">
+                                  <p:stCondLst>
+                                    <p:cond delay="0"/>
+                                  </p:stCondLst>
+                                  <p:childTnLst>
+                                    <p:set>
+                                      <p:cBhvr>
+                                        <p:cTn id="10" dur="1" fill="hold">
+                                          <p:stCondLst>
+                                            <p:cond delay="0"/>
+                                          </p:stCondLst>
+                                        </p:cTn>
+                                        <p:tgtEl>
+                                          <p:spTgt spid="2">
+                                            <p:txEl>
+                                              <p:pRg st="3" end="3"/>
+                                            </p:txEl>
+                                          </p:spTgt>
+                                        </p:tgtEl>
+                                        <p:attrNameLst>
+                                          <p:attrName>style.visibility</p:attrName>
+                                        </p:attrNameLst>
+                                      </p:cBhvr>
+                                      <p:to>
+                                        <p:strVal val="visible"/>
+                                      </p:to>
+                                    </p:set>
+                                  </p:childTnLst>
+                                </p:cTn>
+                              </p:par>
+                            </p:childTnLst>
+                          </p:cTn>
+                        </p:par>
+                      </p:childTnLst>
+                    </p:cTn>
+                  </p:par>
+                  <p:par>
+                    <p:cTn id="11" fill="hold">
+                      <p:stCondLst>
+                        <p:cond delay="indefinite"/>
+                      </p:stCondLst>
+                      <p:childTnLst>
+                        <p:par>
+                          <p:cTn id="12" fill="hold">
+                            <p:stCondLst>
+                              <p:cond delay="0"/>
+                            </p:stCondLst>
+                            <p:childTnLst>
+                              <p:par>
+                                <p:cTn id="13" presetID="1" presetClass="entr" presetSubtype="0" fill="hold" grpId="0" nodeType="clickEffect">
+                                  <p:stCondLst>
+                                    <p:cond delay="0"/>
+                                  </p:stCondLst>
+                                  <p:childTnLst>
+                                    <p:set>
+                                      <p:cBhvr>
+                                        <p:cTn id="14" dur="1" fill="hold">
+                                          <p:stCondLst>
+                                            <p:cond delay="0"/>
+                                          </p:stCondLst>
+                                        </p:cTn>
+                                        <p:tgtEl>
+                                          <p:spTgt spid="2">
+                                            <p:txEl>
+                                              <p:pRg st="5" end="5"/>
+                                            </p:txEl>
+                                          </p:spTgt>
+                                        </p:tgtEl>
+                                        <p:attrNameLst>
+                                          <p:attrName>style.visibility</p:attrName>
+                                        </p:attrNameLst>
+                                      </p:cBhvr>
+                                      <p:to>
+                                        <p:strVal val="visible"/>
+                                      </p:to>
+                                    </p:set>
+                                  </p:childTnLst>
+                                </p:cTn>
+                              </p:par>
+                            </p:childTnLst>
+                          </p:cTn>
+                        </p:par>
+                      </p:childTnLst>
+                    </p:cTn>
+                  </p:par>
+                  <p:par>
+                    <p:cTn id="15" fill="hold">
+                      <p:stCondLst>
+                        <p:cond delay="indefinite"/>
+                      </p:stCondLst>
+                      <p:childTnLst>
+                        <p:par>
+                          <p:cTn id="16" fill="hold">
+                            <p:stCondLst>
+                              <p:cond delay="0"/>
+                            </p:stCondLst>
+                            <p:childTnLst>
+                              <p:par>
+                                <p:cTn id="17" presetID="1" presetClass="entr" presetSubtype="0" fill="hold" grpId="0" nodeType="clickEffect">
+                                  <p:stCondLst>
+                                    <p:cond delay="0"/>
+                                  </p:stCondLst>
+                                  <p:childTnLst>
+                                    <p:set>
+                                      <p:cBhvr>
+                                        <p:cTn id="18" dur="1" fill="hold">
+                                          <p:stCondLst>
+                                            <p:cond delay="0"/>
+                                          </p:stCondLst>
+                                        </p:cTn>
+                                        <p:tgtEl>
+                                          <p:spTgt spid="2">
+                                            <p:txEl>
+                                              <p:pRg st="7" end="7"/>
                                             </p:txEl>
                                           </p:spTgt>
                                         </p:tgtEl>
@@ -5601,6 +6603,36 @@
           <a:chExt cx="0" cy="0"/>
         </a:xfrm>
       </p:grpSpPr>
+      <p:pic>
+        <p:nvPicPr>
+          <p:cNvPr id="4" name="Picture 5">
+            <a:extLst>
+              <a:ext uri="{FF2B5EF4-FFF2-40B4-BE49-F238E27FC236}">
+                <a16:creationId xmlns:a16="http://schemas.microsoft.com/office/drawing/2014/main" id="{03EFBE0F-2CFF-49B1-B0C3-E5319B9F0D27}"/>
+              </a:ext>
+            </a:extLst>
+          </p:cNvPr>
+          <p:cNvPicPr>
+            <a:picLocks noChangeAspect="1"/>
+          </p:cNvPicPr>
+          <p:nvPr/>
+        </p:nvPicPr>
+        <p:blipFill>
+          <a:blip r:embed="rId2"/>
+          <a:stretch>
+            <a:fillRect/>
+          </a:stretch>
+        </p:blipFill>
+        <p:spPr>
+          <a:xfrm rot="1080000">
+            <a:off x="4609213" y="3310476"/>
+            <a:ext cx="3850758" cy="2744560"/>
+          </a:xfrm>
+          <a:prstGeom prst="rect">
+            <a:avLst/>
+          </a:prstGeom>
+        </p:spPr>
+      </p:pic>
       <p:sp>
         <p:nvSpPr>
           <p:cNvPr id="2" name="Inhaltsplatzhalter 1">
@@ -5720,11 +6752,318 @@
                 <a:ea typeface="+mj-lt"/>
                 <a:cs typeface="+mj-lt"/>
               </a:rPr>
-              <a:t>Project 2 – Visualization &amp; anim. of graph interaction</a:t>
+              <a:t>Project 2 – Tasks</a:t>
             </a:r>
             <a:endParaRPr lang="en-US" b="0">
               <a:ea typeface="+mj-lt"/>
               <a:cs typeface="+mj-lt"/>
+            </a:endParaRPr>
+          </a:p>
+        </p:txBody>
+      </p:sp>
+      <p:sp>
+        <p:nvSpPr>
+          <p:cNvPr id="5" name="Inhaltsplatzhalter 1">
+            <a:extLst>
+              <a:ext uri="{FF2B5EF4-FFF2-40B4-BE49-F238E27FC236}">
+                <a16:creationId xmlns:a16="http://schemas.microsoft.com/office/drawing/2014/main" id="{9BF2CD5D-A0BC-4D87-90F3-FD5C4A34D178}"/>
+              </a:ext>
+            </a:extLst>
+          </p:cNvPr>
+          <p:cNvSpPr txBox="1">
+            <a:spLocks/>
+          </p:cNvSpPr>
+          <p:nvPr/>
+        </p:nvSpPr>
+        <p:spPr>
+          <a:xfrm>
+            <a:off x="251519" y="762457"/>
+            <a:ext cx="8640960" cy="5429430"/>
+          </a:xfrm>
+          <a:prstGeom prst="rect">
+            <a:avLst/>
+          </a:prstGeom>
+        </p:spPr>
+        <p:txBody>
+          <a:bodyPr vert="horz" lIns="91440" tIns="45720" rIns="91440" bIns="45720" rtlCol="0" anchor="t">
+            <a:normAutofit/>
+          </a:bodyPr>
+          <a:lstStyle>
+            <a:lvl1pPr marL="342900" indent="-342900" algn="l" defTabSz="914400" rtl="0" eaLnBrk="1" latinLnBrk="0" hangingPunct="1">
+              <a:spcBef>
+                <a:spcPct val="20000"/>
+              </a:spcBef>
+              <a:buFont typeface="Wingdings" pitchFamily="2" charset="2"/>
+              <a:buChar char="§"/>
+              <a:defRPr sz="3200" kern="1200">
+                <a:solidFill>
+                  <a:schemeClr val="tx2"/>
+                </a:solidFill>
+                <a:latin typeface="+mn-lt"/>
+                <a:ea typeface="+mn-ea"/>
+                <a:cs typeface="+mn-cs"/>
+              </a:defRPr>
+            </a:lvl1pPr>
+            <a:lvl2pPr marL="742950" indent="-285750" algn="l" defTabSz="914400" rtl="0" eaLnBrk="1" latinLnBrk="0" hangingPunct="1">
+              <a:spcBef>
+                <a:spcPct val="20000"/>
+              </a:spcBef>
+              <a:buFont typeface="Wingdings" pitchFamily="2" charset="2"/>
+              <a:buChar char="§"/>
+              <a:defRPr sz="2800" kern="1200">
+                <a:solidFill>
+                  <a:schemeClr val="tx2"/>
+                </a:solidFill>
+                <a:latin typeface="+mn-lt"/>
+                <a:ea typeface="+mn-ea"/>
+                <a:cs typeface="+mn-cs"/>
+              </a:defRPr>
+            </a:lvl2pPr>
+            <a:lvl3pPr marL="1143000" indent="-228600" algn="l" defTabSz="914400" rtl="0" eaLnBrk="1" latinLnBrk="0" hangingPunct="1">
+              <a:spcBef>
+                <a:spcPct val="20000"/>
+              </a:spcBef>
+              <a:buFont typeface="Wingdings" pitchFamily="2" charset="2"/>
+              <a:buChar char="§"/>
+              <a:defRPr sz="2400" kern="1200">
+                <a:solidFill>
+                  <a:schemeClr val="tx2"/>
+                </a:solidFill>
+                <a:latin typeface="+mn-lt"/>
+                <a:ea typeface="+mn-ea"/>
+                <a:cs typeface="+mn-cs"/>
+              </a:defRPr>
+            </a:lvl3pPr>
+            <a:lvl4pPr marL="1600200" indent="-228600" algn="l" defTabSz="914400" rtl="0" eaLnBrk="1" latinLnBrk="0" hangingPunct="1">
+              <a:spcBef>
+                <a:spcPct val="20000"/>
+              </a:spcBef>
+              <a:buFont typeface="Wingdings" pitchFamily="2" charset="2"/>
+              <a:buChar char="§"/>
+              <a:defRPr sz="2000" kern="1200">
+                <a:solidFill>
+                  <a:schemeClr val="tx2"/>
+                </a:solidFill>
+                <a:latin typeface="+mn-lt"/>
+                <a:ea typeface="+mn-ea"/>
+                <a:cs typeface="+mn-cs"/>
+              </a:defRPr>
+            </a:lvl4pPr>
+            <a:lvl5pPr marL="2057400" indent="-228600" algn="l" defTabSz="914400" rtl="0" eaLnBrk="1" latinLnBrk="0" hangingPunct="1">
+              <a:spcBef>
+                <a:spcPct val="20000"/>
+              </a:spcBef>
+              <a:buFont typeface="Wingdings" pitchFamily="2" charset="2"/>
+              <a:buChar char="§"/>
+              <a:defRPr sz="2000" kern="1200">
+                <a:solidFill>
+                  <a:schemeClr val="tx2"/>
+                </a:solidFill>
+                <a:latin typeface="+mn-lt"/>
+                <a:ea typeface="+mn-ea"/>
+                <a:cs typeface="+mn-cs"/>
+              </a:defRPr>
+            </a:lvl5pPr>
+            <a:lvl6pPr marL="2514600" indent="-228600" algn="l" defTabSz="914400" rtl="0" eaLnBrk="1" latinLnBrk="0" hangingPunct="1">
+              <a:spcBef>
+                <a:spcPct val="20000"/>
+              </a:spcBef>
+              <a:buFont typeface="Arial" pitchFamily="34" charset="0"/>
+              <a:buChar char="•"/>
+              <a:defRPr sz="2000" kern="1200">
+                <a:solidFill>
+                  <a:schemeClr val="tx1"/>
+                </a:solidFill>
+                <a:latin typeface="+mn-lt"/>
+                <a:ea typeface="+mn-ea"/>
+                <a:cs typeface="+mn-cs"/>
+              </a:defRPr>
+            </a:lvl6pPr>
+            <a:lvl7pPr marL="2971800" indent="-228600" algn="l" defTabSz="914400" rtl="0" eaLnBrk="1" latinLnBrk="0" hangingPunct="1">
+              <a:spcBef>
+                <a:spcPct val="20000"/>
+              </a:spcBef>
+              <a:buFont typeface="Arial" pitchFamily="34" charset="0"/>
+              <a:buChar char="•"/>
+              <a:defRPr sz="2000" kern="1200">
+                <a:solidFill>
+                  <a:schemeClr val="tx1"/>
+                </a:solidFill>
+                <a:latin typeface="+mn-lt"/>
+                <a:ea typeface="+mn-ea"/>
+                <a:cs typeface="+mn-cs"/>
+              </a:defRPr>
+            </a:lvl7pPr>
+            <a:lvl8pPr marL="3429000" indent="-228600" algn="l" defTabSz="914400" rtl="0" eaLnBrk="1" latinLnBrk="0" hangingPunct="1">
+              <a:spcBef>
+                <a:spcPct val="20000"/>
+              </a:spcBef>
+              <a:buFont typeface="Arial" pitchFamily="34" charset="0"/>
+              <a:buChar char="•"/>
+              <a:defRPr sz="2000" kern="1200">
+                <a:solidFill>
+                  <a:schemeClr val="tx1"/>
+                </a:solidFill>
+                <a:latin typeface="+mn-lt"/>
+                <a:ea typeface="+mn-ea"/>
+                <a:cs typeface="+mn-cs"/>
+              </a:defRPr>
+            </a:lvl8pPr>
+            <a:lvl9pPr marL="3886200" indent="-228600" algn="l" defTabSz="914400" rtl="0" eaLnBrk="1" latinLnBrk="0" hangingPunct="1">
+              <a:spcBef>
+                <a:spcPct val="20000"/>
+              </a:spcBef>
+              <a:buFont typeface="Arial" pitchFamily="34" charset="0"/>
+              <a:buChar char="•"/>
+              <a:defRPr sz="2000" kern="1200">
+                <a:solidFill>
+                  <a:schemeClr val="tx1"/>
+                </a:solidFill>
+                <a:latin typeface="+mn-lt"/>
+                <a:ea typeface="+mn-ea"/>
+                <a:cs typeface="+mn-cs"/>
+              </a:defRPr>
+            </a:lvl9pPr>
+          </a:lstStyle>
+          <a:p>
+            <a:pPr marL="0" indent="0">
+              <a:buFont typeface="Wingdings" pitchFamily="2" charset="2"/>
+              <a:buNone/>
+            </a:pPr>
+            <a:r>
+              <a:rPr lang="en-US">
+                <a:cs typeface="Calibri"/>
+              </a:rPr>
+              <a:t>Tasks:</a:t>
+            </a:r>
+          </a:p>
+          <a:p>
+            <a:pPr marL="457200" indent="-457200">
+              <a:buFont typeface="Arial" pitchFamily="2" charset="2"/>
+              <a:buChar char="•"/>
+            </a:pPr>
+            <a:r>
+              <a:rPr lang="en-US" sz="2400">
+                <a:cs typeface="Calibri"/>
+              </a:rPr>
+              <a:t>Research graph visualization algorithms pertinent to recommenders (node &amp; edge types, cluster)</a:t>
+            </a:r>
+          </a:p>
+          <a:p>
+            <a:pPr marL="457200" indent="-457200">
+              <a:buFont typeface="Arial" pitchFamily="2" charset="2"/>
+              <a:buChar char="•"/>
+            </a:pPr>
+            <a:r>
+              <a:rPr lang="en-US" sz="2400">
+                <a:cs typeface="Calibri"/>
+              </a:rPr>
+              <a:t>Either extend our existing (Graphinius) VIS library or decide on a different one (but make sure it's properly extensible)</a:t>
+            </a:r>
+          </a:p>
+          <a:p>
+            <a:pPr marL="457200" indent="-457200">
+              <a:buFont typeface="Arial" pitchFamily="2" charset="2"/>
+              <a:buChar char="•"/>
+            </a:pPr>
+            <a:r>
+              <a:rPr lang="en-US" sz="2400">
+                <a:cs typeface="Calibri"/>
+              </a:rPr>
+              <a:t>Highlight recommendations and influence factors (if available)</a:t>
+            </a:r>
+            <a:endParaRPr lang="en-US" sz="2400" dirty="0">
+              <a:cs typeface="Calibri"/>
+            </a:endParaRPr>
+          </a:p>
+          <a:p>
+            <a:pPr marL="457200" indent="-457200">
+              <a:buFont typeface="Arial" pitchFamily="2" charset="2"/>
+              <a:buChar char="•"/>
+            </a:pPr>
+            <a:r>
+              <a:rPr lang="en-US" sz="2400">
+                <a:cs typeface="Calibri"/>
+              </a:rPr>
+              <a:t>Visualize continuous changes in the graph </a:t>
+            </a:r>
+            <a:endParaRPr lang="en-US" sz="2400" dirty="0">
+              <a:cs typeface="Calibri"/>
+            </a:endParaRPr>
+          </a:p>
+          <a:p>
+            <a:pPr marL="0" indent="0">
+              <a:buNone/>
+            </a:pPr>
+            <a:r>
+              <a:rPr lang="en-US" sz="2400">
+                <a:cs typeface="Calibri"/>
+              </a:rPr>
+              <a:t>       due to user interaction (vids)</a:t>
+            </a:r>
+          </a:p>
+          <a:p>
+            <a:pPr marL="457200" indent="-457200">
+              <a:buFont typeface="Arial" pitchFamily="2" charset="2"/>
+              <a:buChar char="•"/>
+            </a:pPr>
+            <a:r>
+              <a:rPr lang="en-US" sz="2400">
+                <a:cs typeface="Calibri"/>
+              </a:rPr>
+              <a:t>If time permits, visualize</a:t>
+            </a:r>
+            <a:endParaRPr lang="en-US" sz="2400" dirty="0">
+              <a:cs typeface="Calibri"/>
+            </a:endParaRPr>
+          </a:p>
+          <a:p>
+            <a:pPr marL="0" indent="0">
+              <a:buNone/>
+            </a:pPr>
+            <a:r>
+              <a:rPr lang="en-US" sz="2400">
+                <a:cs typeface="Calibri"/>
+              </a:rPr>
+              <a:t>       several local spheres together</a:t>
+            </a:r>
+            <a:endParaRPr lang="en-US" sz="2400" dirty="0">
+              <a:cs typeface="Calibri"/>
+            </a:endParaRPr>
+          </a:p>
+          <a:p>
+            <a:pPr marL="457200" indent="-457200">
+              <a:buFont typeface="Arial" pitchFamily="2" charset="2"/>
+              <a:buChar char="•"/>
+            </a:pPr>
+            <a:r>
+              <a:rPr lang="en-US" sz="2400">
+                <a:cs typeface="Calibri"/>
+              </a:rPr>
+              <a:t>Graphs, recommender &amp; event-</a:t>
+            </a:r>
+          </a:p>
+          <a:p>
+            <a:pPr marL="0" indent="0">
+              <a:buNone/>
+            </a:pPr>
+            <a:r>
+              <a:rPr lang="en-US" sz="2400">
+                <a:cs typeface="Calibri"/>
+              </a:rPr>
+              <a:t>       stream will be provided by us ;-)</a:t>
+            </a:r>
+            <a:endParaRPr lang="en-US" sz="2400" dirty="0">
+              <a:cs typeface="Calibri"/>
+            </a:endParaRPr>
+          </a:p>
+          <a:p>
+            <a:pPr marL="457200" indent="-457200">
+              <a:buFont typeface="Arial" pitchFamily="2" charset="2"/>
+              <a:buChar char="•"/>
+            </a:pPr>
+            <a:endParaRPr lang="en-US" dirty="0">
+              <a:cs typeface="Calibri"/>
             </a:endParaRPr>
           </a:p>
         </p:txBody>
@@ -5801,6 +7140,496 @@
                       </p:childTnLst>
                     </p:cTn>
                   </p:par>
+                  <p:par>
+                    <p:cTn id="7" fill="hold">
+                      <p:stCondLst>
+                        <p:cond delay="indefinite"/>
+                      </p:stCondLst>
+                      <p:childTnLst>
+                        <p:par>
+                          <p:cTn id="8" fill="hold">
+                            <p:stCondLst>
+                              <p:cond delay="0"/>
+                            </p:stCondLst>
+                            <p:childTnLst>
+                              <p:par>
+                                <p:cTn id="9" presetID="1" presetClass="entr" presetSubtype="0" fill="hold" grpId="0" nodeType="clickEffect">
+                                  <p:stCondLst>
+                                    <p:cond delay="0"/>
+                                  </p:stCondLst>
+                                  <p:childTnLst>
+                                    <p:set>
+                                      <p:cBhvr>
+                                        <p:cTn id="10" dur="1" fill="hold">
+                                          <p:stCondLst>
+                                            <p:cond delay="0"/>
+                                          </p:stCondLst>
+                                        </p:cTn>
+                                        <p:tgtEl>
+                                          <p:spTgt spid="5">
+                                            <p:txEl>
+                                              <p:pRg st="0" end="0"/>
+                                            </p:txEl>
+                                          </p:spTgt>
+                                        </p:tgtEl>
+                                        <p:attrNameLst>
+                                          <p:attrName>style.visibility</p:attrName>
+                                        </p:attrNameLst>
+                                      </p:cBhvr>
+                                      <p:to>
+                                        <p:strVal val="visible"/>
+                                      </p:to>
+                                    </p:set>
+                                  </p:childTnLst>
+                                </p:cTn>
+                              </p:par>
+                            </p:childTnLst>
+                          </p:cTn>
+                        </p:par>
+                      </p:childTnLst>
+                    </p:cTn>
+                  </p:par>
+                  <p:par>
+                    <p:cTn id="11" fill="hold">
+                      <p:stCondLst>
+                        <p:cond delay="indefinite"/>
+                      </p:stCondLst>
+                      <p:childTnLst>
+                        <p:par>
+                          <p:cTn id="12" fill="hold">
+                            <p:stCondLst>
+                              <p:cond delay="0"/>
+                            </p:stCondLst>
+                            <p:childTnLst>
+                              <p:par>
+                                <p:cTn id="13" presetID="1" presetClass="entr" presetSubtype="0" fill="hold" grpId="0" nodeType="clickEffect">
+                                  <p:stCondLst>
+                                    <p:cond delay="0"/>
+                                  </p:stCondLst>
+                                  <p:childTnLst>
+                                    <p:set>
+                                      <p:cBhvr>
+                                        <p:cTn id="14" dur="1" fill="hold">
+                                          <p:stCondLst>
+                                            <p:cond delay="0"/>
+                                          </p:stCondLst>
+                                        </p:cTn>
+                                        <p:tgtEl>
+                                          <p:spTgt spid="5">
+                                            <p:txEl>
+                                              <p:pRg st="1" end="1"/>
+                                            </p:txEl>
+                                          </p:spTgt>
+                                        </p:tgtEl>
+                                        <p:attrNameLst>
+                                          <p:attrName>style.visibility</p:attrName>
+                                        </p:attrNameLst>
+                                      </p:cBhvr>
+                                      <p:to>
+                                        <p:strVal val="visible"/>
+                                      </p:to>
+                                    </p:set>
+                                  </p:childTnLst>
+                                </p:cTn>
+                              </p:par>
+                            </p:childTnLst>
+                          </p:cTn>
+                        </p:par>
+                      </p:childTnLst>
+                    </p:cTn>
+                  </p:par>
+                  <p:par>
+                    <p:cTn id="15" fill="hold">
+                      <p:stCondLst>
+                        <p:cond delay="indefinite"/>
+                      </p:stCondLst>
+                      <p:childTnLst>
+                        <p:par>
+                          <p:cTn id="16" fill="hold">
+                            <p:stCondLst>
+                              <p:cond delay="0"/>
+                            </p:stCondLst>
+                            <p:childTnLst>
+                              <p:par>
+                                <p:cTn id="17" presetID="1" presetClass="entr" presetSubtype="0" fill="hold" grpId="0" nodeType="clickEffect">
+                                  <p:stCondLst>
+                                    <p:cond delay="0"/>
+                                  </p:stCondLst>
+                                  <p:childTnLst>
+                                    <p:set>
+                                      <p:cBhvr>
+                                        <p:cTn id="18" dur="1" fill="hold">
+                                          <p:stCondLst>
+                                            <p:cond delay="0"/>
+                                          </p:stCondLst>
+                                        </p:cTn>
+                                        <p:tgtEl>
+                                          <p:spTgt spid="5">
+                                            <p:txEl>
+                                              <p:pRg st="2" end="2"/>
+                                            </p:txEl>
+                                          </p:spTgt>
+                                        </p:tgtEl>
+                                        <p:attrNameLst>
+                                          <p:attrName>style.visibility</p:attrName>
+                                        </p:attrNameLst>
+                                      </p:cBhvr>
+                                      <p:to>
+                                        <p:strVal val="visible"/>
+                                      </p:to>
+                                    </p:set>
+                                  </p:childTnLst>
+                                </p:cTn>
+                              </p:par>
+                            </p:childTnLst>
+                          </p:cTn>
+                        </p:par>
+                      </p:childTnLst>
+                    </p:cTn>
+                  </p:par>
+                  <p:par>
+                    <p:cTn id="19" fill="hold">
+                      <p:stCondLst>
+                        <p:cond delay="indefinite"/>
+                      </p:stCondLst>
+                      <p:childTnLst>
+                        <p:par>
+                          <p:cTn id="20" fill="hold">
+                            <p:stCondLst>
+                              <p:cond delay="0"/>
+                            </p:stCondLst>
+                            <p:childTnLst>
+                              <p:par>
+                                <p:cTn id="21" presetID="1" presetClass="entr" presetSubtype="0" fill="hold" grpId="0" nodeType="clickEffect">
+                                  <p:stCondLst>
+                                    <p:cond delay="0"/>
+                                  </p:stCondLst>
+                                  <p:childTnLst>
+                                    <p:set>
+                                      <p:cBhvr>
+                                        <p:cTn id="22" dur="1" fill="hold">
+                                          <p:stCondLst>
+                                            <p:cond delay="0"/>
+                                          </p:stCondLst>
+                                        </p:cTn>
+                                        <p:tgtEl>
+                                          <p:spTgt spid="5">
+                                            <p:txEl>
+                                              <p:pRg st="3" end="3"/>
+                                            </p:txEl>
+                                          </p:spTgt>
+                                        </p:tgtEl>
+                                        <p:attrNameLst>
+                                          <p:attrName>style.visibility</p:attrName>
+                                        </p:attrNameLst>
+                                      </p:cBhvr>
+                                      <p:to>
+                                        <p:strVal val="visible"/>
+                                      </p:to>
+                                    </p:set>
+                                  </p:childTnLst>
+                                </p:cTn>
+                              </p:par>
+                            </p:childTnLst>
+                          </p:cTn>
+                        </p:par>
+                      </p:childTnLst>
+                    </p:cTn>
+                  </p:par>
+                  <p:par>
+                    <p:cTn id="23" fill="hold">
+                      <p:stCondLst>
+                        <p:cond delay="indefinite"/>
+                      </p:stCondLst>
+                      <p:childTnLst>
+                        <p:par>
+                          <p:cTn id="24" fill="hold">
+                            <p:stCondLst>
+                              <p:cond delay="0"/>
+                            </p:stCondLst>
+                            <p:childTnLst>
+                              <p:par>
+                                <p:cTn id="25" presetID="1" presetClass="entr" presetSubtype="0" fill="hold" grpId="0" nodeType="clickEffect">
+                                  <p:stCondLst>
+                                    <p:cond delay="0"/>
+                                  </p:stCondLst>
+                                  <p:childTnLst>
+                                    <p:set>
+                                      <p:cBhvr>
+                                        <p:cTn id="26" dur="1" fill="hold">
+                                          <p:stCondLst>
+                                            <p:cond delay="0"/>
+                                          </p:stCondLst>
+                                        </p:cTn>
+                                        <p:tgtEl>
+                                          <p:spTgt spid="5">
+                                            <p:txEl>
+                                              <p:pRg st="4" end="4"/>
+                                            </p:txEl>
+                                          </p:spTgt>
+                                        </p:tgtEl>
+                                        <p:attrNameLst>
+                                          <p:attrName>style.visibility</p:attrName>
+                                        </p:attrNameLst>
+                                      </p:cBhvr>
+                                      <p:to>
+                                        <p:strVal val="visible"/>
+                                      </p:to>
+                                    </p:set>
+                                  </p:childTnLst>
+                                </p:cTn>
+                              </p:par>
+                            </p:childTnLst>
+                          </p:cTn>
+                        </p:par>
+                      </p:childTnLst>
+                    </p:cTn>
+                  </p:par>
+                  <p:par>
+                    <p:cTn id="27" fill="hold">
+                      <p:stCondLst>
+                        <p:cond delay="indefinite"/>
+                      </p:stCondLst>
+                      <p:childTnLst>
+                        <p:par>
+                          <p:cTn id="28" fill="hold">
+                            <p:stCondLst>
+                              <p:cond delay="0"/>
+                            </p:stCondLst>
+                            <p:childTnLst>
+                              <p:par>
+                                <p:cTn id="29" presetID="1" presetClass="entr" presetSubtype="0" fill="hold" grpId="0" nodeType="clickEffect">
+                                  <p:stCondLst>
+                                    <p:cond delay="0"/>
+                                  </p:stCondLst>
+                                  <p:childTnLst>
+                                    <p:set>
+                                      <p:cBhvr>
+                                        <p:cTn id="30" dur="1" fill="hold">
+                                          <p:stCondLst>
+                                            <p:cond delay="0"/>
+                                          </p:stCondLst>
+                                        </p:cTn>
+                                        <p:tgtEl>
+                                          <p:spTgt spid="5">
+                                            <p:txEl>
+                                              <p:pRg st="5" end="5"/>
+                                            </p:txEl>
+                                          </p:spTgt>
+                                        </p:tgtEl>
+                                        <p:attrNameLst>
+                                          <p:attrName>style.visibility</p:attrName>
+                                        </p:attrNameLst>
+                                      </p:cBhvr>
+                                      <p:to>
+                                        <p:strVal val="visible"/>
+                                      </p:to>
+                                    </p:set>
+                                  </p:childTnLst>
+                                </p:cTn>
+                              </p:par>
+                            </p:childTnLst>
+                          </p:cTn>
+                        </p:par>
+                      </p:childTnLst>
+                    </p:cTn>
+                  </p:par>
+                  <p:par>
+                    <p:cTn id="31" fill="hold">
+                      <p:stCondLst>
+                        <p:cond delay="indefinite"/>
+                      </p:stCondLst>
+                      <p:childTnLst>
+                        <p:par>
+                          <p:cTn id="32" fill="hold">
+                            <p:stCondLst>
+                              <p:cond delay="0"/>
+                            </p:stCondLst>
+                            <p:childTnLst>
+                              <p:par>
+                                <p:cTn id="33" presetID="1" presetClass="entr" presetSubtype="0" fill="hold" grpId="0" nodeType="clickEffect">
+                                  <p:stCondLst>
+                                    <p:cond delay="0"/>
+                                  </p:stCondLst>
+                                  <p:childTnLst>
+                                    <p:set>
+                                      <p:cBhvr>
+                                        <p:cTn id="34" dur="1" fill="hold">
+                                          <p:stCondLst>
+                                            <p:cond delay="0"/>
+                                          </p:stCondLst>
+                                        </p:cTn>
+                                        <p:tgtEl>
+                                          <p:spTgt spid="5">
+                                            <p:txEl>
+                                              <p:pRg st="6" end="6"/>
+                                            </p:txEl>
+                                          </p:spTgt>
+                                        </p:tgtEl>
+                                        <p:attrNameLst>
+                                          <p:attrName>style.visibility</p:attrName>
+                                        </p:attrNameLst>
+                                      </p:cBhvr>
+                                      <p:to>
+                                        <p:strVal val="visible"/>
+                                      </p:to>
+                                    </p:set>
+                                  </p:childTnLst>
+                                </p:cTn>
+                              </p:par>
+                            </p:childTnLst>
+                          </p:cTn>
+                        </p:par>
+                      </p:childTnLst>
+                    </p:cTn>
+                  </p:par>
+                  <p:par>
+                    <p:cTn id="35" fill="hold">
+                      <p:stCondLst>
+                        <p:cond delay="indefinite"/>
+                      </p:stCondLst>
+                      <p:childTnLst>
+                        <p:par>
+                          <p:cTn id="36" fill="hold">
+                            <p:stCondLst>
+                              <p:cond delay="0"/>
+                            </p:stCondLst>
+                            <p:childTnLst>
+                              <p:par>
+                                <p:cTn id="37" presetID="1" presetClass="entr" presetSubtype="0" fill="hold" grpId="0" nodeType="clickEffect">
+                                  <p:stCondLst>
+                                    <p:cond delay="0"/>
+                                  </p:stCondLst>
+                                  <p:childTnLst>
+                                    <p:set>
+                                      <p:cBhvr>
+                                        <p:cTn id="38" dur="1" fill="hold">
+                                          <p:stCondLst>
+                                            <p:cond delay="0"/>
+                                          </p:stCondLst>
+                                        </p:cTn>
+                                        <p:tgtEl>
+                                          <p:spTgt spid="5">
+                                            <p:txEl>
+                                              <p:pRg st="7" end="7"/>
+                                            </p:txEl>
+                                          </p:spTgt>
+                                        </p:tgtEl>
+                                        <p:attrNameLst>
+                                          <p:attrName>style.visibility</p:attrName>
+                                        </p:attrNameLst>
+                                      </p:cBhvr>
+                                      <p:to>
+                                        <p:strVal val="visible"/>
+                                      </p:to>
+                                    </p:set>
+                                  </p:childTnLst>
+                                </p:cTn>
+                              </p:par>
+                            </p:childTnLst>
+                          </p:cTn>
+                        </p:par>
+                      </p:childTnLst>
+                    </p:cTn>
+                  </p:par>
+                  <p:par>
+                    <p:cTn id="39" fill="hold">
+                      <p:stCondLst>
+                        <p:cond delay="indefinite"/>
+                      </p:stCondLst>
+                      <p:childTnLst>
+                        <p:par>
+                          <p:cTn id="40" fill="hold">
+                            <p:stCondLst>
+                              <p:cond delay="0"/>
+                            </p:stCondLst>
+                            <p:childTnLst>
+                              <p:par>
+                                <p:cTn id="41" presetID="1" presetClass="entr" presetSubtype="0" fill="hold" grpId="0" nodeType="clickEffect">
+                                  <p:stCondLst>
+                                    <p:cond delay="0"/>
+                                  </p:stCondLst>
+                                  <p:childTnLst>
+                                    <p:set>
+                                      <p:cBhvr>
+                                        <p:cTn id="42" dur="1" fill="hold">
+                                          <p:stCondLst>
+                                            <p:cond delay="0"/>
+                                          </p:stCondLst>
+                                        </p:cTn>
+                                        <p:tgtEl>
+                                          <p:spTgt spid="5">
+                                            <p:txEl>
+                                              <p:pRg st="8" end="8"/>
+                                            </p:txEl>
+                                          </p:spTgt>
+                                        </p:tgtEl>
+                                        <p:attrNameLst>
+                                          <p:attrName>style.visibility</p:attrName>
+                                        </p:attrNameLst>
+                                      </p:cBhvr>
+                                      <p:to>
+                                        <p:strVal val="visible"/>
+                                      </p:to>
+                                    </p:set>
+                                  </p:childTnLst>
+                                </p:cTn>
+                              </p:par>
+                            </p:childTnLst>
+                          </p:cTn>
+                        </p:par>
+                      </p:childTnLst>
+                    </p:cTn>
+                  </p:par>
+                  <p:par>
+                    <p:cTn id="43" fill="hold">
+                      <p:stCondLst>
+                        <p:cond delay="indefinite"/>
+                      </p:stCondLst>
+                      <p:childTnLst>
+                        <p:par>
+                          <p:cTn id="44" fill="hold">
+                            <p:stCondLst>
+                              <p:cond delay="0"/>
+                            </p:stCondLst>
+                            <p:childTnLst>
+                              <p:par>
+                                <p:cTn id="45" presetID="1" presetClass="entr" presetSubtype="0" fill="hold" grpId="0" nodeType="clickEffect">
+                                  <p:stCondLst>
+                                    <p:cond delay="0"/>
+                                  </p:stCondLst>
+                                  <p:childTnLst>
+                                    <p:set>
+                                      <p:cBhvr>
+                                        <p:cTn id="46" dur="1" fill="hold">
+                                          <p:stCondLst>
+                                            <p:cond delay="0"/>
+                                          </p:stCondLst>
+                                        </p:cTn>
+                                        <p:tgtEl>
+                                          <p:spTgt spid="5">
+                                            <p:txEl>
+                                              <p:pRg st="9" end="9"/>
+                                            </p:txEl>
+                                          </p:spTgt>
+                                        </p:tgtEl>
+                                        <p:attrNameLst>
+                                          <p:attrName>style.visibility</p:attrName>
+                                        </p:attrNameLst>
+                                      </p:cBhvr>
+                                      <p:to>
+                                        <p:strVal val="visible"/>
+                                      </p:to>
+                                    </p:set>
+                                  </p:childTnLst>
+                                </p:cTn>
+                              </p:par>
+                            </p:childTnLst>
+                          </p:cTn>
+                        </p:par>
+                      </p:childTnLst>
+                    </p:cTn>
+                  </p:par>
                 </p:childTnLst>
               </p:cTn>
               <p:prevCondLst>
@@ -5824,6 +7653,7 @@
     </p:tnLst>
     <p:bldLst>
       <p:bldP spid="2" grpId="0" build="p"/>
+      <p:bldP spid="5" grpId="0" build="p"/>
     </p:bldLst>
   </p:timing>
 </p:sld>

</xml_diff>